<commit_message>
updated template and ppt presentation from work
</commit_message>
<xml_diff>
--- a/template.pptx
+++ b/template.pptx
@@ -5,14 +5,13 @@
     <p:sldMasterId id="2147483764" r:id="rId1"/>
   </p:sldMasterIdLst>
   <p:handoutMasterIdLst>
-    <p:handoutMasterId r:id="rId7"/>
+    <p:handoutMasterId r:id="rId6"/>
   </p:handoutMasterIdLst>
   <p:sldIdLst>
     <p:sldId id="256" r:id="rId2"/>
-    <p:sldId id="257" r:id="rId3"/>
-    <p:sldId id="258" r:id="rId4"/>
-    <p:sldId id="259" r:id="rId5"/>
-    <p:sldId id="260" r:id="rId6"/>
+    <p:sldId id="262" r:id="rId3"/>
+    <p:sldId id="260" r:id="rId4"/>
+    <p:sldId id="261" r:id="rId5"/>
   </p:sldIdLst>
   <p:sldSz cx="9144000" cy="6858000" type="letter"/>
   <p:notesSz cx="7010400" cy="9296400"/>
@@ -256,7 +255,7 @@
           <a:p>
             <a:fld id="{24462540-8DE6-4FD8-AB8C-15635D6C1EAD}" type="datetimeFigureOut">
               <a:rPr lang="en-US" smtClean="0"/>
-              <a:t>11/12/2019</a:t>
+              <a:t>11/13/2019</a:t>
             </a:fld>
             <a:endParaRPr lang="en-US"/>
           </a:p>
@@ -685,6 +684,242 @@
 
 <file path=ppt/slideLayouts/slideLayout10.xml><?xml version="1.0" encoding="utf-8"?>
 <p:sldLayout xmlns:a="http://schemas.openxmlformats.org/drawingml/2006/main" xmlns:r="http://schemas.openxmlformats.org/officeDocument/2006/relationships" xmlns:p="http://schemas.openxmlformats.org/presentationml/2006/main" type="secHead" preserve="1">
+  <p:cSld name="Chapter Header">
+    <p:spTree>
+      <p:nvGrpSpPr>
+        <p:cNvPr id="1" name=""/>
+        <p:cNvGrpSpPr/>
+        <p:nvPr/>
+      </p:nvGrpSpPr>
+      <p:grpSpPr>
+        <a:xfrm>
+          <a:off x="0" y="0"/>
+          <a:ext cx="0" cy="0"/>
+          <a:chOff x="0" y="0"/>
+          <a:chExt cx="0" cy="0"/>
+        </a:xfrm>
+      </p:grpSpPr>
+      <p:sp>
+        <p:nvSpPr>
+          <p:cNvPr id="2" name="Title 1"/>
+          <p:cNvSpPr>
+            <a:spLocks noGrp="1"/>
+          </p:cNvSpPr>
+          <p:nvPr>
+            <p:ph type="title"/>
+          </p:nvPr>
+        </p:nvSpPr>
+        <p:spPr>
+          <a:xfrm>
+            <a:off x="722313" y="4406900"/>
+            <a:ext cx="7772400" cy="1362075"/>
+          </a:xfrm>
+        </p:spPr>
+        <p:txBody>
+          <a:bodyPr anchor="t">
+            <a:normAutofit/>
+          </a:bodyPr>
+          <a:lstStyle>
+            <a:lvl1pPr algn="l">
+              <a:defRPr sz="3200" b="1" cap="all"/>
+            </a:lvl1pPr>
+          </a:lstStyle>
+          <a:p>
+            <a:r>
+              <a:rPr lang="en-US"/>
+              <a:t>Click to edit Master title style</a:t>
+            </a:r>
+          </a:p>
+        </p:txBody>
+      </p:sp>
+      <p:sp>
+        <p:nvSpPr>
+          <p:cNvPr id="3" name="Text Placeholder 2"/>
+          <p:cNvSpPr>
+            <a:spLocks noGrp="1"/>
+          </p:cNvSpPr>
+          <p:nvPr>
+            <p:ph type="body" idx="1" hasCustomPrompt="1"/>
+          </p:nvPr>
+        </p:nvSpPr>
+        <p:spPr>
+          <a:xfrm>
+            <a:off x="722313" y="2906713"/>
+            <a:ext cx="7772400" cy="1500187"/>
+          </a:xfrm>
+        </p:spPr>
+        <p:txBody>
+          <a:bodyPr anchor="b"/>
+          <a:lstStyle>
+            <a:lvl1pPr marL="0" indent="0">
+              <a:buNone/>
+              <a:defRPr sz="2000">
+                <a:solidFill>
+                  <a:schemeClr val="tx1">
+                    <a:tint val="75000"/>
+                  </a:schemeClr>
+                </a:solidFill>
+              </a:defRPr>
+            </a:lvl1pPr>
+            <a:lvl2pPr marL="457200" indent="0">
+              <a:buNone/>
+              <a:defRPr sz="1800">
+                <a:solidFill>
+                  <a:schemeClr val="tx1">
+                    <a:tint val="75000"/>
+                  </a:schemeClr>
+                </a:solidFill>
+              </a:defRPr>
+            </a:lvl2pPr>
+            <a:lvl3pPr marL="914400" indent="0">
+              <a:buNone/>
+              <a:defRPr sz="1600">
+                <a:solidFill>
+                  <a:schemeClr val="tx1">
+                    <a:tint val="75000"/>
+                  </a:schemeClr>
+                </a:solidFill>
+              </a:defRPr>
+            </a:lvl3pPr>
+            <a:lvl4pPr marL="1371600" indent="0">
+              <a:buNone/>
+              <a:defRPr sz="1400">
+                <a:solidFill>
+                  <a:schemeClr val="tx1">
+                    <a:tint val="75000"/>
+                  </a:schemeClr>
+                </a:solidFill>
+              </a:defRPr>
+            </a:lvl4pPr>
+            <a:lvl5pPr marL="1828800" indent="0">
+              <a:buNone/>
+              <a:defRPr sz="1400">
+                <a:solidFill>
+                  <a:schemeClr val="tx1">
+                    <a:tint val="75000"/>
+                  </a:schemeClr>
+                </a:solidFill>
+              </a:defRPr>
+            </a:lvl5pPr>
+            <a:lvl6pPr marL="2286000" indent="0">
+              <a:buNone/>
+              <a:defRPr sz="1400">
+                <a:solidFill>
+                  <a:schemeClr val="tx1">
+                    <a:tint val="75000"/>
+                  </a:schemeClr>
+                </a:solidFill>
+              </a:defRPr>
+            </a:lvl6pPr>
+            <a:lvl7pPr marL="2743200" indent="0">
+              <a:buNone/>
+              <a:defRPr sz="1400">
+                <a:solidFill>
+                  <a:schemeClr val="tx1">
+                    <a:tint val="75000"/>
+                  </a:schemeClr>
+                </a:solidFill>
+              </a:defRPr>
+            </a:lvl7pPr>
+            <a:lvl8pPr marL="3200400" indent="0">
+              <a:buNone/>
+              <a:defRPr sz="1400">
+                <a:solidFill>
+                  <a:schemeClr val="tx1">
+                    <a:tint val="75000"/>
+                  </a:schemeClr>
+                </a:solidFill>
+              </a:defRPr>
+            </a:lvl8pPr>
+            <a:lvl9pPr marL="3657600" indent="0">
+              <a:buNone/>
+              <a:defRPr sz="1400">
+                <a:solidFill>
+                  <a:schemeClr val="tx1">
+                    <a:tint val="75000"/>
+                  </a:schemeClr>
+                </a:solidFill>
+              </a:defRPr>
+            </a:lvl9pPr>
+          </a:lstStyle>
+          <a:p>
+            <a:pPr lvl="0"/>
+            <a:r>
+              <a:rPr lang="en-US" dirty="0"/>
+              <a:t>Chapter</a:t>
+            </a:r>
+          </a:p>
+        </p:txBody>
+      </p:sp>
+      <p:sp>
+        <p:nvSpPr>
+          <p:cNvPr id="7" name="Date Placeholder 6"/>
+          <p:cNvSpPr>
+            <a:spLocks noGrp="1"/>
+          </p:cNvSpPr>
+          <p:nvPr>
+            <p:ph type="dt" sz="half" idx="10"/>
+          </p:nvPr>
+        </p:nvSpPr>
+        <p:spPr/>
+        <p:txBody>
+          <a:bodyPr/>
+          <a:lstStyle/>
+          <a:p>
+            <a:r>
+              <a:rPr lang="en-US"/>
+              <a:t>June 2019</a:t>
+            </a:r>
+            <a:endParaRPr lang="en-US" dirty="0"/>
+          </a:p>
+        </p:txBody>
+      </p:sp>
+      <p:sp>
+        <p:nvSpPr>
+          <p:cNvPr id="8" name="Slide Number Placeholder 7"/>
+          <p:cNvSpPr>
+            <a:spLocks noGrp="1"/>
+          </p:cNvSpPr>
+          <p:nvPr>
+            <p:ph type="sldNum" sz="quarter" idx="11"/>
+          </p:nvPr>
+        </p:nvSpPr>
+        <p:spPr/>
+        <p:txBody>
+          <a:bodyPr/>
+          <a:lstStyle/>
+          <a:p>
+            <a:fld id="{CB29584B-2C78-4F19-9D57-A8D27C3B25A0}" type="slidenum">
+              <a:rPr lang="en-US" smtClean="0"/>
+              <a:pPr/>
+              <a:t>‹#›</a:t>
+            </a:fld>
+            <a:endParaRPr lang="en-US" dirty="0"/>
+          </a:p>
+        </p:txBody>
+      </p:sp>
+    </p:spTree>
+    <p:extLst>
+      <p:ext uri="{BB962C8B-B14F-4D97-AF65-F5344CB8AC3E}">
+        <p14:creationId xmlns:p14="http://schemas.microsoft.com/office/powerpoint/2010/main" val="3286900170"/>
+      </p:ext>
+    </p:extLst>
+  </p:cSld>
+  <p:clrMapOvr>
+    <a:masterClrMapping/>
+  </p:clrMapOvr>
+  <p:timing>
+    <p:tnLst>
+      <p:par>
+        <p:cTn id="1" dur="indefinite" restart="never" nodeType="tmRoot"/>
+      </p:par>
+    </p:tnLst>
+  </p:timing>
+</p:sldLayout>
+</file>
+
+<file path=ppt/slideLayouts/slideLayout11.xml><?xml version="1.0" encoding="utf-8"?>
+<p:sldLayout xmlns:a="http://schemas.openxmlformats.org/drawingml/2006/main" xmlns:r="http://schemas.openxmlformats.org/officeDocument/2006/relationships" xmlns:p="http://schemas.openxmlformats.org/presentationml/2006/main" type="secHead" preserve="1">
   <p:cSld name="Appendix Header">
     <p:spTree>
       <p:nvGrpSpPr>
@@ -919,7 +1154,7 @@
 </p:sldLayout>
 </file>
 
-<file path=ppt/slideLayouts/slideLayout11.xml><?xml version="1.0" encoding="utf-8"?>
+<file path=ppt/slideLayouts/slideLayout12.xml><?xml version="1.0" encoding="utf-8"?>
 <p:sldLayout xmlns:a="http://schemas.openxmlformats.org/drawingml/2006/main" xmlns:r="http://schemas.openxmlformats.org/officeDocument/2006/relationships" xmlns:p="http://schemas.openxmlformats.org/presentationml/2006/main" showMasterSp="0" preserve="1" userDrawn="1">
   <p:cSld name="Report Figure">
     <p:spTree>
@@ -1048,7 +1283,7 @@
 </p:sldLayout>
 </file>
 
-<file path=ppt/slideLayouts/slideLayout12.xml><?xml version="1.0" encoding="utf-8"?>
+<file path=ppt/slideLayouts/slideLayout13.xml><?xml version="1.0" encoding="utf-8"?>
 <p:sldLayout xmlns:a="http://schemas.openxmlformats.org/drawingml/2006/main" xmlns:r="http://schemas.openxmlformats.org/officeDocument/2006/relationships" xmlns:p="http://schemas.openxmlformats.org/presentationml/2006/main" type="objTx" preserve="1">
   <p:cSld name="Content with Caption">
     <p:spTree>
@@ -1308,7 +1543,7 @@
 </p:sldLayout>
 </file>
 
-<file path=ppt/slideLayouts/slideLayout13.xml><?xml version="1.0" encoding="utf-8"?>
+<file path=ppt/slideLayouts/slideLayout14.xml><?xml version="1.0" encoding="utf-8"?>
 <p:sldLayout xmlns:a="http://schemas.openxmlformats.org/drawingml/2006/main" xmlns:r="http://schemas.openxmlformats.org/officeDocument/2006/relationships" xmlns:p="http://schemas.openxmlformats.org/presentationml/2006/main" type="picTx" preserve="1">
   <p:cSld name="Picture with Caption">
     <p:spTree>
@@ -1555,7 +1790,7 @@
 </p:sldLayout>
 </file>
 
-<file path=ppt/slideLayouts/slideLayout14.xml><?xml version="1.0" encoding="utf-8"?>
+<file path=ppt/slideLayouts/slideLayout15.xml><?xml version="1.0" encoding="utf-8"?>
 <p:sldLayout xmlns:a="http://schemas.openxmlformats.org/drawingml/2006/main" xmlns:r="http://schemas.openxmlformats.org/officeDocument/2006/relationships" xmlns:p="http://schemas.openxmlformats.org/presentationml/2006/main" userDrawn="1">
   <p:cSld name="1_Title Slide">
     <p:bg>
@@ -1913,7 +2148,7 @@
 </p:sldLayout>
 </file>
 
-<file path=ppt/slideLayouts/slideLayout15.xml><?xml version="1.0" encoding="utf-8"?>
+<file path=ppt/slideLayouts/slideLayout16.xml><?xml version="1.0" encoding="utf-8"?>
 <p:sldLayout xmlns:a="http://schemas.openxmlformats.org/drawingml/2006/main" xmlns:r="http://schemas.openxmlformats.org/officeDocument/2006/relationships" xmlns:p="http://schemas.openxmlformats.org/presentationml/2006/main" preserve="1" userDrawn="1">
   <p:cSld name="Custom Layout">
     <p:spTree>
@@ -2052,7 +2287,7 @@
 </p:sldLayout>
 </file>
 
-<file path=ppt/slideLayouts/slideLayout16.xml><?xml version="1.0" encoding="utf-8"?>
+<file path=ppt/slideLayouts/slideLayout17.xml><?xml version="1.0" encoding="utf-8"?>
 <p:sldLayout xmlns:a="http://schemas.openxmlformats.org/drawingml/2006/main" xmlns:r="http://schemas.openxmlformats.org/officeDocument/2006/relationships" xmlns:p="http://schemas.openxmlformats.org/presentationml/2006/main" type="blank" preserve="1">
   <p:cSld name="SECRET Cover Sheet">
     <p:spTree>
@@ -2454,7 +2689,7 @@
 </p:sldLayout>
 </file>
 
-<file path=ppt/slideLayouts/slideLayout17.xml><?xml version="1.0" encoding="utf-8"?>
+<file path=ppt/slideLayouts/slideLayout18.xml><?xml version="1.0" encoding="utf-8"?>
 <p:sldLayout xmlns:a="http://schemas.openxmlformats.org/drawingml/2006/main" xmlns:r="http://schemas.openxmlformats.org/officeDocument/2006/relationships" xmlns:p="http://schemas.openxmlformats.org/presentationml/2006/main" type="blank" preserve="1">
   <p:cSld name="CONFIDENTIAL Cover Sheet">
     <p:spTree>
@@ -2856,7 +3091,7 @@
 </p:sldLayout>
 </file>
 
-<file path=ppt/slideLayouts/slideLayout18.xml><?xml version="1.0" encoding="utf-8"?>
+<file path=ppt/slideLayouts/slideLayout19.xml><?xml version="1.0" encoding="utf-8"?>
 <p:sldLayout xmlns:a="http://schemas.openxmlformats.org/drawingml/2006/main" xmlns:r="http://schemas.openxmlformats.org/officeDocument/2006/relationships" xmlns:p="http://schemas.openxmlformats.org/presentationml/2006/main" type="obj" preserve="1">
   <p:cSld name="1_Title and Content">
     <p:spTree>
@@ -3209,6 +3444,267 @@
 </file>
 
 <file path=ppt/slideLayouts/slideLayout3.xml><?xml version="1.0" encoding="utf-8"?>
+<p:sldLayout xmlns:a="http://schemas.openxmlformats.org/drawingml/2006/main" xmlns:r="http://schemas.openxmlformats.org/officeDocument/2006/relationships" xmlns:p="http://schemas.openxmlformats.org/presentationml/2006/main" type="secHead" preserve="1">
+  <p:cSld name="Section Header">
+    <p:spTree>
+      <p:nvGrpSpPr>
+        <p:cNvPr id="1" name=""/>
+        <p:cNvGrpSpPr/>
+        <p:nvPr/>
+      </p:nvGrpSpPr>
+      <p:grpSpPr>
+        <a:xfrm>
+          <a:off x="0" y="0"/>
+          <a:ext cx="0" cy="0"/>
+          <a:chOff x="0" y="0"/>
+          <a:chExt cx="0" cy="0"/>
+        </a:xfrm>
+      </p:grpSpPr>
+      <p:sp>
+        <p:nvSpPr>
+          <p:cNvPr id="2" name="Title 1"/>
+          <p:cNvSpPr>
+            <a:spLocks noGrp="1"/>
+          </p:cNvSpPr>
+          <p:nvPr>
+            <p:ph type="title"/>
+          </p:nvPr>
+        </p:nvSpPr>
+        <p:spPr>
+          <a:xfrm>
+            <a:off x="623888" y="1709739"/>
+            <a:ext cx="7886700" cy="2852737"/>
+          </a:xfrm>
+        </p:spPr>
+        <p:txBody>
+          <a:bodyPr anchor="b"/>
+          <a:lstStyle>
+            <a:lvl1pPr>
+              <a:defRPr sz="4500"/>
+            </a:lvl1pPr>
+          </a:lstStyle>
+          <a:p>
+            <a:r>
+              <a:rPr lang="en-US" smtClean="0"/>
+              <a:t>Click to edit Master title style</a:t>
+            </a:r>
+            <a:endParaRPr lang="en-US"/>
+          </a:p>
+        </p:txBody>
+      </p:sp>
+      <p:sp>
+        <p:nvSpPr>
+          <p:cNvPr id="3" name="Text Placeholder 2"/>
+          <p:cNvSpPr>
+            <a:spLocks noGrp="1"/>
+          </p:cNvSpPr>
+          <p:nvPr>
+            <p:ph type="body" idx="1"/>
+          </p:nvPr>
+        </p:nvSpPr>
+        <p:spPr>
+          <a:xfrm>
+            <a:off x="623888" y="4589464"/>
+            <a:ext cx="7886700" cy="1500187"/>
+          </a:xfrm>
+        </p:spPr>
+        <p:txBody>
+          <a:bodyPr/>
+          <a:lstStyle>
+            <a:lvl1pPr marL="0" indent="0">
+              <a:buNone/>
+              <a:defRPr sz="1800">
+                <a:solidFill>
+                  <a:schemeClr val="tx1">
+                    <a:tint val="75000"/>
+                  </a:schemeClr>
+                </a:solidFill>
+              </a:defRPr>
+            </a:lvl1pPr>
+            <a:lvl2pPr marL="342900" indent="0">
+              <a:buNone/>
+              <a:defRPr sz="1500">
+                <a:solidFill>
+                  <a:schemeClr val="tx1">
+                    <a:tint val="75000"/>
+                  </a:schemeClr>
+                </a:solidFill>
+              </a:defRPr>
+            </a:lvl2pPr>
+            <a:lvl3pPr marL="685800" indent="0">
+              <a:buNone/>
+              <a:defRPr sz="1350">
+                <a:solidFill>
+                  <a:schemeClr val="tx1">
+                    <a:tint val="75000"/>
+                  </a:schemeClr>
+                </a:solidFill>
+              </a:defRPr>
+            </a:lvl3pPr>
+            <a:lvl4pPr marL="1028700" indent="0">
+              <a:buNone/>
+              <a:defRPr sz="1200">
+                <a:solidFill>
+                  <a:schemeClr val="tx1">
+                    <a:tint val="75000"/>
+                  </a:schemeClr>
+                </a:solidFill>
+              </a:defRPr>
+            </a:lvl4pPr>
+            <a:lvl5pPr marL="1371600" indent="0">
+              <a:buNone/>
+              <a:defRPr sz="1200">
+                <a:solidFill>
+                  <a:schemeClr val="tx1">
+                    <a:tint val="75000"/>
+                  </a:schemeClr>
+                </a:solidFill>
+              </a:defRPr>
+            </a:lvl5pPr>
+            <a:lvl6pPr marL="1714500" indent="0">
+              <a:buNone/>
+              <a:defRPr sz="1200">
+                <a:solidFill>
+                  <a:schemeClr val="tx1">
+                    <a:tint val="75000"/>
+                  </a:schemeClr>
+                </a:solidFill>
+              </a:defRPr>
+            </a:lvl6pPr>
+            <a:lvl7pPr marL="2057400" indent="0">
+              <a:buNone/>
+              <a:defRPr sz="1200">
+                <a:solidFill>
+                  <a:schemeClr val="tx1">
+                    <a:tint val="75000"/>
+                  </a:schemeClr>
+                </a:solidFill>
+              </a:defRPr>
+            </a:lvl7pPr>
+            <a:lvl8pPr marL="2400300" indent="0">
+              <a:buNone/>
+              <a:defRPr sz="1200">
+                <a:solidFill>
+                  <a:schemeClr val="tx1">
+                    <a:tint val="75000"/>
+                  </a:schemeClr>
+                </a:solidFill>
+              </a:defRPr>
+            </a:lvl8pPr>
+            <a:lvl9pPr marL="2743200" indent="0">
+              <a:buNone/>
+              <a:defRPr sz="1200">
+                <a:solidFill>
+                  <a:schemeClr val="tx1">
+                    <a:tint val="75000"/>
+                  </a:schemeClr>
+                </a:solidFill>
+              </a:defRPr>
+            </a:lvl9pPr>
+          </a:lstStyle>
+          <a:p>
+            <a:pPr lvl="0"/>
+            <a:r>
+              <a:rPr lang="en-US" smtClean="0"/>
+              <a:t>Click to edit Master text styles</a:t>
+            </a:r>
+          </a:p>
+        </p:txBody>
+      </p:sp>
+      <p:sp>
+        <p:nvSpPr>
+          <p:cNvPr id="4" name="Date Placeholder 3"/>
+          <p:cNvSpPr>
+            <a:spLocks noGrp="1"/>
+          </p:cNvSpPr>
+          <p:nvPr>
+            <p:ph type="dt" sz="half" idx="10"/>
+          </p:nvPr>
+        </p:nvSpPr>
+        <p:spPr/>
+        <p:txBody>
+          <a:bodyPr/>
+          <a:lstStyle/>
+          <a:p>
+            <a:fld id="{126F9973-2A43-4259-943D-13AC1C602F10}" type="datetimeFigureOut">
+              <a:rPr lang="en-US" smtClean="0"/>
+              <a:t>11/13/2019</a:t>
+            </a:fld>
+            <a:endParaRPr lang="en-US"/>
+          </a:p>
+        </p:txBody>
+      </p:sp>
+      <p:sp>
+        <p:nvSpPr>
+          <p:cNvPr id="5" name="Footer Placeholder 4"/>
+          <p:cNvSpPr>
+            <a:spLocks noGrp="1"/>
+          </p:cNvSpPr>
+          <p:nvPr>
+            <p:ph type="ftr" sz="quarter" idx="11"/>
+          </p:nvPr>
+        </p:nvSpPr>
+        <p:spPr>
+          <a:xfrm>
+            <a:off x="3028950" y="6356351"/>
+            <a:ext cx="3086100" cy="365125"/>
+          </a:xfrm>
+          <a:prstGeom prst="rect">
+            <a:avLst/>
+          </a:prstGeom>
+        </p:spPr>
+        <p:txBody>
+          <a:bodyPr/>
+          <a:lstStyle/>
+          <a:p>
+            <a:endParaRPr lang="en-US"/>
+          </a:p>
+        </p:txBody>
+      </p:sp>
+      <p:sp>
+        <p:nvSpPr>
+          <p:cNvPr id="6" name="Slide Number Placeholder 5"/>
+          <p:cNvSpPr>
+            <a:spLocks noGrp="1"/>
+          </p:cNvSpPr>
+          <p:nvPr>
+            <p:ph type="sldNum" sz="quarter" idx="12"/>
+          </p:nvPr>
+        </p:nvSpPr>
+        <p:spPr/>
+        <p:txBody>
+          <a:bodyPr/>
+          <a:lstStyle/>
+          <a:p>
+            <a:fld id="{78A7F2FC-87CE-43F9-8295-ACD3D9920F59}" type="slidenum">
+              <a:rPr lang="en-US" smtClean="0"/>
+              <a:t>‹#›</a:t>
+            </a:fld>
+            <a:endParaRPr lang="en-US"/>
+          </a:p>
+        </p:txBody>
+      </p:sp>
+    </p:spTree>
+    <p:extLst>
+      <p:ext uri="{BB962C8B-B14F-4D97-AF65-F5344CB8AC3E}">
+        <p14:creationId xmlns:p14="http://schemas.microsoft.com/office/powerpoint/2010/main" val="1795258109"/>
+      </p:ext>
+    </p:extLst>
+  </p:cSld>
+  <p:clrMapOvr>
+    <a:masterClrMapping/>
+  </p:clrMapOvr>
+  <p:timing>
+    <p:tnLst>
+      <p:par>
+        <p:cTn id="1" dur="indefinite" restart="never" nodeType="tmRoot"/>
+      </p:par>
+    </p:tnLst>
+  </p:timing>
+</p:sldLayout>
+</file>
+
+<file path=ppt/slideLayouts/slideLayout4.xml><?xml version="1.0" encoding="utf-8"?>
 <p:sldLayout xmlns:a="http://schemas.openxmlformats.org/drawingml/2006/main" xmlns:r="http://schemas.openxmlformats.org/officeDocument/2006/relationships" xmlns:p="http://schemas.openxmlformats.org/presentationml/2006/main" preserve="1" userDrawn="1">
   <p:cSld name="Two Content">
     <p:spTree>
@@ -3538,7 +4034,7 @@
 </p:sldLayout>
 </file>
 
-<file path=ppt/slideLayouts/slideLayout4.xml><?xml version="1.0" encoding="utf-8"?>
+<file path=ppt/slideLayouts/slideLayout5.xml><?xml version="1.0" encoding="utf-8"?>
 <p:sldLayout xmlns:a="http://schemas.openxmlformats.org/drawingml/2006/main" xmlns:r="http://schemas.openxmlformats.org/officeDocument/2006/relationships" xmlns:p="http://schemas.openxmlformats.org/presentationml/2006/main" preserve="1" userDrawn="1">
   <p:cSld name="Comparison">
     <p:spTree>
@@ -4088,7 +4584,7 @@
 </p:sldLayout>
 </file>
 
-<file path=ppt/slideLayouts/slideLayout5.xml><?xml version="1.0" encoding="utf-8"?>
+<file path=ppt/slideLayouts/slideLayout6.xml><?xml version="1.0" encoding="utf-8"?>
 <p:sldLayout xmlns:a="http://schemas.openxmlformats.org/drawingml/2006/main" xmlns:r="http://schemas.openxmlformats.org/officeDocument/2006/relationships" xmlns:p="http://schemas.openxmlformats.org/presentationml/2006/main" preserve="1" userDrawn="1">
   <p:cSld name="Quad Chart">
     <p:spTree>
@@ -5141,7 +5637,7 @@
 </p:sldLayout>
 </file>
 
-<file path=ppt/slideLayouts/slideLayout6.xml><?xml version="1.0" encoding="utf-8"?>
+<file path=ppt/slideLayouts/slideLayout7.xml><?xml version="1.0" encoding="utf-8"?>
 <p:sldLayout xmlns:a="http://schemas.openxmlformats.org/drawingml/2006/main" xmlns:r="http://schemas.openxmlformats.org/officeDocument/2006/relationships" xmlns:p="http://schemas.openxmlformats.org/presentationml/2006/main" preserve="1" userDrawn="1">
   <p:cSld name="Title Only">
     <p:spTree>
@@ -5247,7 +5743,7 @@
 </p:sldLayout>
 </file>
 
-<file path=ppt/slideLayouts/slideLayout7.xml><?xml version="1.0" encoding="utf-8"?>
+<file path=ppt/slideLayouts/slideLayout8.xml><?xml version="1.0" encoding="utf-8"?>
 <p:sldLayout xmlns:a="http://schemas.openxmlformats.org/drawingml/2006/main" xmlns:r="http://schemas.openxmlformats.org/officeDocument/2006/relationships" xmlns:p="http://schemas.openxmlformats.org/presentationml/2006/main" preserve="1" userDrawn="1">
   <p:cSld name="Transition Title">
     <p:spTree>
@@ -5360,7 +5856,7 @@
 </p:sldLayout>
 </file>
 
-<file path=ppt/slideLayouts/slideLayout8.xml><?xml version="1.0" encoding="utf-8"?>
+<file path=ppt/slideLayouts/slideLayout9.xml><?xml version="1.0" encoding="utf-8"?>
 <p:sldLayout xmlns:a="http://schemas.openxmlformats.org/drawingml/2006/main" xmlns:r="http://schemas.openxmlformats.org/officeDocument/2006/relationships" xmlns:p="http://schemas.openxmlformats.org/presentationml/2006/main" type="blank" preserve="1">
   <p:cSld name="Blank">
     <p:spTree>
@@ -5428,242 +5924,6 @@
     <p:extLst>
       <p:ext uri="{BB962C8B-B14F-4D97-AF65-F5344CB8AC3E}">
         <p14:creationId xmlns:p14="http://schemas.microsoft.com/office/powerpoint/2010/main" val="4219369617"/>
-      </p:ext>
-    </p:extLst>
-  </p:cSld>
-  <p:clrMapOvr>
-    <a:masterClrMapping/>
-  </p:clrMapOvr>
-  <p:timing>
-    <p:tnLst>
-      <p:par>
-        <p:cTn id="1" dur="indefinite" restart="never" nodeType="tmRoot"/>
-      </p:par>
-    </p:tnLst>
-  </p:timing>
-</p:sldLayout>
-</file>
-
-<file path=ppt/slideLayouts/slideLayout9.xml><?xml version="1.0" encoding="utf-8"?>
-<p:sldLayout xmlns:a="http://schemas.openxmlformats.org/drawingml/2006/main" xmlns:r="http://schemas.openxmlformats.org/officeDocument/2006/relationships" xmlns:p="http://schemas.openxmlformats.org/presentationml/2006/main" type="secHead" preserve="1">
-  <p:cSld name="Chapter Header">
-    <p:spTree>
-      <p:nvGrpSpPr>
-        <p:cNvPr id="1" name=""/>
-        <p:cNvGrpSpPr/>
-        <p:nvPr/>
-      </p:nvGrpSpPr>
-      <p:grpSpPr>
-        <a:xfrm>
-          <a:off x="0" y="0"/>
-          <a:ext cx="0" cy="0"/>
-          <a:chOff x="0" y="0"/>
-          <a:chExt cx="0" cy="0"/>
-        </a:xfrm>
-      </p:grpSpPr>
-      <p:sp>
-        <p:nvSpPr>
-          <p:cNvPr id="2" name="Title 1"/>
-          <p:cNvSpPr>
-            <a:spLocks noGrp="1"/>
-          </p:cNvSpPr>
-          <p:nvPr>
-            <p:ph type="title"/>
-          </p:nvPr>
-        </p:nvSpPr>
-        <p:spPr>
-          <a:xfrm>
-            <a:off x="722313" y="4406900"/>
-            <a:ext cx="7772400" cy="1362075"/>
-          </a:xfrm>
-        </p:spPr>
-        <p:txBody>
-          <a:bodyPr anchor="t">
-            <a:normAutofit/>
-          </a:bodyPr>
-          <a:lstStyle>
-            <a:lvl1pPr algn="l">
-              <a:defRPr sz="3200" b="1" cap="all"/>
-            </a:lvl1pPr>
-          </a:lstStyle>
-          <a:p>
-            <a:r>
-              <a:rPr lang="en-US"/>
-              <a:t>Click to edit Master title style</a:t>
-            </a:r>
-          </a:p>
-        </p:txBody>
-      </p:sp>
-      <p:sp>
-        <p:nvSpPr>
-          <p:cNvPr id="3" name="Text Placeholder 2"/>
-          <p:cNvSpPr>
-            <a:spLocks noGrp="1"/>
-          </p:cNvSpPr>
-          <p:nvPr>
-            <p:ph type="body" idx="1" hasCustomPrompt="1"/>
-          </p:nvPr>
-        </p:nvSpPr>
-        <p:spPr>
-          <a:xfrm>
-            <a:off x="722313" y="2906713"/>
-            <a:ext cx="7772400" cy="1500187"/>
-          </a:xfrm>
-        </p:spPr>
-        <p:txBody>
-          <a:bodyPr anchor="b"/>
-          <a:lstStyle>
-            <a:lvl1pPr marL="0" indent="0">
-              <a:buNone/>
-              <a:defRPr sz="2000">
-                <a:solidFill>
-                  <a:schemeClr val="tx1">
-                    <a:tint val="75000"/>
-                  </a:schemeClr>
-                </a:solidFill>
-              </a:defRPr>
-            </a:lvl1pPr>
-            <a:lvl2pPr marL="457200" indent="0">
-              <a:buNone/>
-              <a:defRPr sz="1800">
-                <a:solidFill>
-                  <a:schemeClr val="tx1">
-                    <a:tint val="75000"/>
-                  </a:schemeClr>
-                </a:solidFill>
-              </a:defRPr>
-            </a:lvl2pPr>
-            <a:lvl3pPr marL="914400" indent="0">
-              <a:buNone/>
-              <a:defRPr sz="1600">
-                <a:solidFill>
-                  <a:schemeClr val="tx1">
-                    <a:tint val="75000"/>
-                  </a:schemeClr>
-                </a:solidFill>
-              </a:defRPr>
-            </a:lvl3pPr>
-            <a:lvl4pPr marL="1371600" indent="0">
-              <a:buNone/>
-              <a:defRPr sz="1400">
-                <a:solidFill>
-                  <a:schemeClr val="tx1">
-                    <a:tint val="75000"/>
-                  </a:schemeClr>
-                </a:solidFill>
-              </a:defRPr>
-            </a:lvl4pPr>
-            <a:lvl5pPr marL="1828800" indent="0">
-              <a:buNone/>
-              <a:defRPr sz="1400">
-                <a:solidFill>
-                  <a:schemeClr val="tx1">
-                    <a:tint val="75000"/>
-                  </a:schemeClr>
-                </a:solidFill>
-              </a:defRPr>
-            </a:lvl5pPr>
-            <a:lvl6pPr marL="2286000" indent="0">
-              <a:buNone/>
-              <a:defRPr sz="1400">
-                <a:solidFill>
-                  <a:schemeClr val="tx1">
-                    <a:tint val="75000"/>
-                  </a:schemeClr>
-                </a:solidFill>
-              </a:defRPr>
-            </a:lvl6pPr>
-            <a:lvl7pPr marL="2743200" indent="0">
-              <a:buNone/>
-              <a:defRPr sz="1400">
-                <a:solidFill>
-                  <a:schemeClr val="tx1">
-                    <a:tint val="75000"/>
-                  </a:schemeClr>
-                </a:solidFill>
-              </a:defRPr>
-            </a:lvl7pPr>
-            <a:lvl8pPr marL="3200400" indent="0">
-              <a:buNone/>
-              <a:defRPr sz="1400">
-                <a:solidFill>
-                  <a:schemeClr val="tx1">
-                    <a:tint val="75000"/>
-                  </a:schemeClr>
-                </a:solidFill>
-              </a:defRPr>
-            </a:lvl8pPr>
-            <a:lvl9pPr marL="3657600" indent="0">
-              <a:buNone/>
-              <a:defRPr sz="1400">
-                <a:solidFill>
-                  <a:schemeClr val="tx1">
-                    <a:tint val="75000"/>
-                  </a:schemeClr>
-                </a:solidFill>
-              </a:defRPr>
-            </a:lvl9pPr>
-          </a:lstStyle>
-          <a:p>
-            <a:pPr lvl="0"/>
-            <a:r>
-              <a:rPr lang="en-US" dirty="0"/>
-              <a:t>Chapter</a:t>
-            </a:r>
-          </a:p>
-        </p:txBody>
-      </p:sp>
-      <p:sp>
-        <p:nvSpPr>
-          <p:cNvPr id="7" name="Date Placeholder 6"/>
-          <p:cNvSpPr>
-            <a:spLocks noGrp="1"/>
-          </p:cNvSpPr>
-          <p:nvPr>
-            <p:ph type="dt" sz="half" idx="10"/>
-          </p:nvPr>
-        </p:nvSpPr>
-        <p:spPr/>
-        <p:txBody>
-          <a:bodyPr/>
-          <a:lstStyle/>
-          <a:p>
-            <a:r>
-              <a:rPr lang="en-US"/>
-              <a:t>June 2019</a:t>
-            </a:r>
-            <a:endParaRPr lang="en-US" dirty="0"/>
-          </a:p>
-        </p:txBody>
-      </p:sp>
-      <p:sp>
-        <p:nvSpPr>
-          <p:cNvPr id="8" name="Slide Number Placeholder 7"/>
-          <p:cNvSpPr>
-            <a:spLocks noGrp="1"/>
-          </p:cNvSpPr>
-          <p:nvPr>
-            <p:ph type="sldNum" sz="quarter" idx="11"/>
-          </p:nvPr>
-        </p:nvSpPr>
-        <p:spPr/>
-        <p:txBody>
-          <a:bodyPr/>
-          <a:lstStyle/>
-          <a:p>
-            <a:fld id="{CB29584B-2C78-4F19-9D57-A8D27C3B25A0}" type="slidenum">
-              <a:rPr lang="en-US" smtClean="0"/>
-              <a:pPr/>
-              <a:t>‹#›</a:t>
-            </a:fld>
-            <a:endParaRPr lang="en-US" dirty="0"/>
-          </a:p>
-        </p:txBody>
-      </p:sp>
-    </p:spTree>
-    <p:extLst>
-      <p:ext uri="{BB962C8B-B14F-4D97-AF65-F5344CB8AC3E}">
-        <p14:creationId xmlns:p14="http://schemas.microsoft.com/office/powerpoint/2010/main" val="3286900170"/>
       </p:ext>
     </p:extLst>
   </p:cSld>
@@ -6039,7 +6299,7 @@
           <p:nvPr userDrawn="1"/>
         </p:nvPicPr>
         <p:blipFill>
-          <a:blip r:embed="rId20" cstate="print">
+          <a:blip r:embed="rId21" cstate="print">
             <a:extLst>
               <a:ext uri="{28A0092B-C50C-407E-A947-70E740481C1C}">
                 <a14:useLocalDpi xmlns:a14="http://schemas.microsoft.com/office/drawing/2010/main" val="0"/>
@@ -6106,7 +6366,7 @@
           <p:nvPr userDrawn="1"/>
         </p:nvPicPr>
         <p:blipFill>
-          <a:blip r:embed="rId21" cstate="print">
+          <a:blip r:embed="rId22" cstate="print">
             <a:extLst>
               <a:ext uri="{28A0092B-C50C-407E-A947-70E740481C1C}">
                 <a14:useLocalDpi xmlns:a14="http://schemas.microsoft.com/office/drawing/2010/main" val="0"/>
@@ -6138,22 +6398,23 @@
   <p:sldLayoutIdLst>
     <p:sldLayoutId id="2147483765" r:id="rId1"/>
     <p:sldLayoutId id="2147483766" r:id="rId2"/>
-    <p:sldLayoutId id="2147483767" r:id="rId3"/>
-    <p:sldLayoutId id="2147483768" r:id="rId4"/>
-    <p:sldLayoutId id="2147483769" r:id="rId5"/>
-    <p:sldLayoutId id="2147483770" r:id="rId6"/>
-    <p:sldLayoutId id="2147483771" r:id="rId7"/>
-    <p:sldLayoutId id="2147483772" r:id="rId8"/>
-    <p:sldLayoutId id="2147483773" r:id="rId9"/>
-    <p:sldLayoutId id="2147483774" r:id="rId10"/>
-    <p:sldLayoutId id="2147483775" r:id="rId11"/>
-    <p:sldLayoutId id="2147483776" r:id="rId12"/>
-    <p:sldLayoutId id="2147483777" r:id="rId13"/>
-    <p:sldLayoutId id="2147483870" r:id="rId14"/>
-    <p:sldLayoutId id="2147483904" r:id="rId15"/>
-    <p:sldLayoutId id="2147483901" r:id="rId16"/>
-    <p:sldLayoutId id="2147483902" r:id="rId17"/>
-    <p:sldLayoutId id="2147483903" r:id="rId18"/>
+    <p:sldLayoutId id="2147483905" r:id="rId3"/>
+    <p:sldLayoutId id="2147483767" r:id="rId4"/>
+    <p:sldLayoutId id="2147483768" r:id="rId5"/>
+    <p:sldLayoutId id="2147483769" r:id="rId6"/>
+    <p:sldLayoutId id="2147483770" r:id="rId7"/>
+    <p:sldLayoutId id="2147483771" r:id="rId8"/>
+    <p:sldLayoutId id="2147483772" r:id="rId9"/>
+    <p:sldLayoutId id="2147483773" r:id="rId10"/>
+    <p:sldLayoutId id="2147483774" r:id="rId11"/>
+    <p:sldLayoutId id="2147483775" r:id="rId12"/>
+    <p:sldLayoutId id="2147483776" r:id="rId13"/>
+    <p:sldLayoutId id="2147483777" r:id="rId14"/>
+    <p:sldLayoutId id="2147483870" r:id="rId15"/>
+    <p:sldLayoutId id="2147483904" r:id="rId16"/>
+    <p:sldLayoutId id="2147483901" r:id="rId17"/>
+    <p:sldLayoutId id="2147483902" r:id="rId18"/>
+    <p:sldLayoutId id="2147483903" r:id="rId19"/>
   </p:sldLayoutIdLst>
   <p:timing>
     <p:tnLst>
@@ -6636,36 +6897,6 @@
           <a:chExt cx="0" cy="0"/>
         </a:xfrm>
       </p:grpSpPr>
-      <p:pic>
-        <p:nvPicPr>
-          <p:cNvPr id="7" name="Picture 6"/>
-          <p:cNvPicPr>
-            <a:picLocks noChangeAspect="1"/>
-          </p:cNvPicPr>
-          <p:nvPr userDrawn="1"/>
-        </p:nvPicPr>
-        <p:blipFill>
-          <a:blip cstate="print">
-            <a:extLst>
-              <a:ext uri="{28A0092B-C50C-407E-A947-70E740481C1C}">
-                <a14:useLocalDpi xmlns:a14="http://schemas.microsoft.com/office/drawing/2010/main" val="0"/>
-              </a:ext>
-            </a:extLst>
-          </a:blip>
-          <a:stretch>
-            <a:fillRect/>
-          </a:stretch>
-        </p:blipFill>
-        <p:spPr>
-          <a:xfrm>
-            <a:off x="2743200" y="1600200"/>
-            <a:ext cx="3657600" cy="3657600"/>
-          </a:xfrm>
-          <a:prstGeom prst="rect">
-            <a:avLst/>
-          </a:prstGeom>
-        </p:spPr>
-      </p:pic>
       <p:sp>
         <p:nvSpPr>
           <p:cNvPr id="2" name="Title 1"/>
@@ -6690,9 +6921,10 @@
               <a:buNone/>
             </a:pPr>
             <a:r>
-              <a:rPr/>
-              <a:t>MORS Emerging Techniques Tidymodels</a:t>
-            </a:r>
+              <a:rPr lang="en-US" dirty="0" smtClean="0"/>
+              <a:t>Title Template</a:t>
+            </a:r>
+            <a:endParaRPr dirty="0"/>
           </a:p>
         </p:txBody>
       </p:sp>
@@ -6720,15 +6952,21 @@
               <a:buNone/>
             </a:pPr>
             <a:r>
+              <a:rPr dirty="0"/>
               <a:t/>
             </a:r>
-            <a:br/>
-            <a:r>
+            <a:br>
+              <a:rPr dirty="0"/>
+            </a:br>
+            <a:r>
+              <a:rPr dirty="0"/>
               <a:t/>
             </a:r>
-            <a:br/>
-            <a:r>
-              <a:rPr/>
+            <a:br>
+              <a:rPr dirty="0"/>
+            </a:br>
+            <a:r>
+              <a:rPr dirty="0"/>
               <a:t>MAJ Dusty Turner</a:t>
             </a:r>
           </a:p>
@@ -6787,7 +7025,7 @@
             </a:pPr>
             <a:r>
               <a:rPr/>
-              <a:t>R Markdown</a:t>
+              <a:t>What We’re Going to Do:</a:t>
             </a:r>
           </a:p>
         </p:txBody>
@@ -6807,44 +7045,51 @@
           <a:bodyPr/>
           <a:lstStyle/>
           <a:p>
-            <a:pPr marL="0" lvl="0" indent="0">
-              <a:buNone/>
+            <a:pPr lvl="1"/>
+            <a:r>
+              <a:rPr dirty="0"/>
+              <a:t>Introduce a Data Problem</a:t>
+            </a:r>
+          </a:p>
+          <a:p>
+            <a:pPr lvl="2">
+              <a:buFont typeface="Calibri" panose="020F0502020204030204" pitchFamily="34" charset="0"/>
+              <a:buChar char="-"/>
             </a:pPr>
             <a:r>
-              <a:rPr/>
-              <a:t>This is an R Markdown presentation. Markdown is a simple formatting syntax for authoring HTML, PDF, and MS Word documents. For more details on using R Markdown see </a:t>
-            </a:r>
-            <a:r>
-              <a:rPr>
-                <a:hlinkClick r:id="rId2"/>
-              </a:rPr>
-              <a:t>http://rmarkdown.rstudio.com</a:t>
-            </a:r>
-            <a:r>
-              <a:rPr/>
-              <a:t>.</a:t>
-            </a:r>
-          </a:p>
-          <a:p>
-            <a:pPr marL="0" lvl="0" indent="0">
-              <a:buNone/>
-            </a:pPr>
-            <a:r>
-              <a:rPr/>
-              <a:t>When you click the </a:t>
-            </a:r>
-            <a:r>
-              <a:rPr b="1"/>
-              <a:t>Knit</a:t>
-            </a:r>
-            <a:r>
-              <a:rPr/>
-              <a:t> button a document will be generated that includes both content as well as the output of any embedded R code chunks within the document.</a:t>
+              <a:rPr dirty="0"/>
+              <a:t>Flying Hour Challenge</a:t>
+            </a:r>
+          </a:p>
+          <a:p>
+            <a:pPr lvl="1"/>
+            <a:r>
+              <a:rPr dirty="0"/>
+              <a:t>Show the ‘old technique’</a:t>
+            </a:r>
+          </a:p>
+          <a:p>
+            <a:pPr lvl="1"/>
+            <a:r>
+              <a:rPr dirty="0"/>
+              <a:t>Show the new technique</a:t>
+            </a:r>
+          </a:p>
+          <a:p>
+            <a:pPr lvl="1"/>
+            <a:r>
+              <a:rPr dirty="0"/>
+              <a:t>Discuss Challenges</a:t>
             </a:r>
           </a:p>
         </p:txBody>
       </p:sp>
     </p:spTree>
+    <p:extLst>
+      <p:ext uri="{BB962C8B-B14F-4D97-AF65-F5344CB8AC3E}">
+        <p14:creationId xmlns:p14="http://schemas.microsoft.com/office/powerpoint/2010/main" val="709530783"/>
+      </p:ext>
+    </p:extLst>
   </p:cSld>
   <p:clrMapOvr>
     <a:masterClrMapping/>
@@ -6871,7 +7116,7 @@
       </p:grpSpPr>
       <p:sp>
         <p:nvSpPr>
-          <p:cNvPr id="8" name="Title 7"/>
+          <p:cNvPr id="2" name="Title 1"/>
           <p:cNvSpPr>
             <a:spLocks noGrp="1"/>
           </p:cNvSpPr>
@@ -6884,24 +7129,18 @@
           <a:bodyPr/>
           <a:lstStyle/>
           <a:p>
-            <a:pPr marL="0" lvl="0" indent="0">
-              <a:buNone/>
-            </a:pPr>
-            <a:r>
-              <a:rPr/>
-              <a:t>Slide with Bullets</a:t>
-            </a:r>
-          </a:p>
-        </p:txBody>
-      </p:sp>
-      <p:sp>
-        <p:nvSpPr>
-          <p:cNvPr id="3" name="Content Placeholder 2"/>
-          <p:cNvSpPr>
-            <a:spLocks noGrp="1"/>
-          </p:cNvSpPr>
-          <p:nvPr>
-            <p:ph idx="1"/>
+            <a:endParaRPr lang="en-US"/>
+          </a:p>
+        </p:txBody>
+      </p:sp>
+      <p:sp>
+        <p:nvSpPr>
+          <p:cNvPr id="3" name="Text Placeholder 2"/>
+          <p:cNvSpPr>
+            <a:spLocks noGrp="1"/>
+          </p:cNvSpPr>
+          <p:nvPr>
+            <p:ph type="body" idx="1"/>
           </p:nvPr>
         </p:nvSpPr>
         <p:spPr/>
@@ -6909,33 +7148,27 @@
           <a:bodyPr/>
           <a:lstStyle/>
           <a:p>
-            <a:pPr lvl="1"/>
-            <a:r>
-              <a:rPr/>
-              <a:t>Bullet 1</a:t>
-            </a:r>
-          </a:p>
-          <a:p>
-            <a:pPr lvl="1"/>
-            <a:r>
-              <a:rPr/>
-              <a:t>Bullet 2</a:t>
-            </a:r>
-          </a:p>
-          <a:p>
-            <a:pPr lvl="1"/>
-            <a:r>
-              <a:rPr/>
-              <a:t>Bullet 3</a:t>
-            </a:r>
+            <a:endParaRPr lang="en-US"/>
           </a:p>
         </p:txBody>
       </p:sp>
     </p:spTree>
+    <p:extLst>
+      <p:ext uri="{BB962C8B-B14F-4D97-AF65-F5344CB8AC3E}">
+        <p14:creationId xmlns:p14="http://schemas.microsoft.com/office/powerpoint/2010/main" val="3404148594"/>
+      </p:ext>
+    </p:extLst>
   </p:cSld>
   <p:clrMapOvr>
     <a:masterClrMapping/>
   </p:clrMapOvr>
+  <p:timing>
+    <p:tnLst>
+      <p:par>
+        <p:cTn id="1" dur="indefinite" restart="never" nodeType="tmRoot"/>
+      </p:par>
+    </p:tnLst>
+  </p:timing>
 </p:sld>
 </file>
 
@@ -6958,7 +7191,7 @@
       </p:grpSpPr>
       <p:sp>
         <p:nvSpPr>
-          <p:cNvPr id="8" name="Title 7"/>
+          <p:cNvPr id="9" name="Title 8"/>
           <p:cNvSpPr>
             <a:spLocks noGrp="1"/>
           </p:cNvSpPr>
@@ -6976,7 +7209,7 @@
             </a:pPr>
             <a:r>
               <a:rPr/>
-              <a:t>Slide with R Output</a:t>
+              <a:t>Tidymodels</a:t>
             </a:r>
           </a:p>
         </p:txBody>
@@ -6988,194 +7221,68 @@
             <a:spLocks noGrp="1"/>
           </p:cNvSpPr>
           <p:nvPr>
-            <p:ph type="body" sz="quarter" idx="12"/>
+            <p:ph sz="half" idx="1"/>
           </p:nvPr>
         </p:nvSpPr>
         <p:spPr/>
         <p:txBody>
-          <a:bodyPr>
-            <a:normAutofit fontScale="25000" lnSpcReduction="20000"/>
-          </a:bodyPr>
+          <a:bodyPr/>
           <a:lstStyle/>
           <a:p>
-            <a:pPr marL="1270000" lvl="0" indent="0">
-              <a:buNone/>
-            </a:pPr>
-            <a:r>
-              <a:rPr sz="1800" b="1">
-                <a:solidFill>
-                  <a:srgbClr val="007020"/>
-                </a:solidFill>
-                <a:latin typeface="Courier"/>
-              </a:rPr>
-              <a:t>summary</a:t>
+            <a:pPr lvl="1"/>
+            <a:r>
+              <a:rPr/>
+              <a:t>“</a:t>
             </a:r>
             <a:r>
               <a:rPr sz="1800">
                 <a:latin typeface="Courier"/>
               </a:rPr>
-              <a:t>(cars)</a:t>
-            </a:r>
-          </a:p>
-          <a:p>
-            <a:pPr marL="1270000" lvl="0" indent="0">
-              <a:buNone/>
-            </a:pPr>
+              <a:t>tidymodels</a:t>
+            </a:r>
+            <a:r>
+              <a:rPr/>
+              <a:t> is a ’’meta-package” for modeling and statistical analysis that share the underlying design philosophy, grammar, and data structures of the tidyverse."</a:t>
+            </a:r>
+          </a:p>
+          <a:p>
+            <a:pPr lvl="1"/>
+            <a:r>
+              <a:rPr>
+                <a:hlinkClick r:id="rId2"/>
+              </a:rPr>
+              <a:t>https://github.com/tidymodels/tidymodels</a:t>
+            </a:r>
+          </a:p>
+          <a:p>
+            <a:pPr lvl="1"/>
             <a:r>
               <a:rPr sz="1800">
                 <a:latin typeface="Courier"/>
               </a:rPr>
-              <a:t>##      speed           dist       
-##  Min.   : 4.0   Min.   :  2.00  
-##  1st Qu.:12.0   1st Qu.: 26.00  
-##  Median :15.0   Median : 36.00  
-##  Mean   :15.4   Mean   : 42.98  
-##  3rd Qu.:19.0   3rd Qu.: 56.00  
-##  Max.   :25.0   Max.   :120.00</a:t>
-            </a:r>
-          </a:p>
-          <a:p>
-            <a:pPr marL="1270000" lvl="0" indent="0">
-              <a:buNone/>
-            </a:pPr>
-            <a:r>
-              <a:rPr sz="1800">
-                <a:latin typeface="Courier"/>
-              </a:rPr>
-              <a:t>cars</a:t>
-            </a:r>
-          </a:p>
-          <a:p>
-            <a:pPr marL="1270000" lvl="0" indent="0">
-              <a:buNone/>
-            </a:pPr>
-            <a:r>
-              <a:rPr sz="1800">
-                <a:latin typeface="Courier"/>
-              </a:rPr>
-              <a:t>##    speed dist
-## 1      4    2
-## 2      4   10
-## 3      7    4
-## 4      7   22
-## 5      8   16
-## 6      9   10
-## 7     10   18
-## 8     10   26
-## 9     10   34
-## 10    11   17
-## 11    11   28
-## 12    12   14
-## 13    12   20
-## 14    12   24
-## 15    12   28
-## 16    13   26
-## 17    13   34
-## 18    13   34
-## 19    13   46
-## 20    14   26
-## 21    14   36
-## 22    14   60
-## 23    14   80
-## 24    15   20
-## 25    15   26
-## 26    15   54
-## 27    16   32
-## 28    16   40
-## 29    17   32
-## 30    17   40
-## 31    17   50
-## 32    18   42
-## 33    18   56
-## 34    18   76
-## 35    18   84
-## 36    19   36
-## 37    19   46
-## 38    19   68
-## 39    20   32
-## 40    20   48
-## 41    20   52
-## 42    20   56
-## 43    20   64
-## 44    22   66
-## 45    23   54
-## 46    24   70
-## 47    24   92
-## 48    24   93
-## 49    24  120
-## 50    25   85</a:t>
-            </a:r>
-          </a:p>
-        </p:txBody>
-      </p:sp>
-    </p:spTree>
-  </p:cSld>
-  <p:clrMapOvr>
-    <a:masterClrMapping/>
-  </p:clrMapOvr>
-</p:sld>
-</file>
-
-<file path=ppt/slides/slide5.xml><?xml version="1.0" encoding="utf-8"?>
-<p:sld xmlns:a="http://schemas.openxmlformats.org/drawingml/2006/main" xmlns:r="http://schemas.openxmlformats.org/officeDocument/2006/relationships" xmlns:p="http://schemas.openxmlformats.org/presentationml/2006/main">
-  <p:cSld>
-    <p:spTree>
-      <p:nvGrpSpPr>
-        <p:cNvPr id="1" name=""/>
-        <p:cNvGrpSpPr/>
-        <p:nvPr/>
-      </p:nvGrpSpPr>
-      <p:grpSpPr>
-        <a:xfrm>
-          <a:off x="0" y="0"/>
-          <a:ext cx="0" cy="0"/>
-          <a:chOff x="0" y="0"/>
-          <a:chExt cx="0" cy="0"/>
-        </a:xfrm>
-      </p:grpSpPr>
-      <p:sp>
-        <p:nvSpPr>
-          <p:cNvPr id="8" name="Title 7"/>
-          <p:cNvSpPr>
-            <a:spLocks noGrp="1"/>
-          </p:cNvSpPr>
-          <p:nvPr>
-            <p:ph type="title"/>
-          </p:nvPr>
-        </p:nvSpPr>
-        <p:spPr/>
-        <p:txBody>
-          <a:bodyPr/>
-          <a:lstStyle/>
-          <a:p>
-            <a:pPr marL="0" lvl="0" indent="0">
-              <a:buNone/>
-            </a:pPr>
-            <a:r>
-              <a:rPr/>
-              <a:t>Slide with Plot</a:t>
+              <a:t>install.packages("tidymodels")</a:t>
             </a:r>
           </a:p>
         </p:txBody>
       </p:sp>
       <p:pic>
         <p:nvPicPr>
-          <p:cNvPr id="2" name="Picture 1" descr="emerging_techniques_mors_tidymodels_files/figure-pptx/pressure-1.png"/>
+          <p:cNvPr id="2" name="Picture 1" descr="03_presentation_files/max.JPG"/>
           <p:cNvPicPr>
             <a:picLocks noGrp="1" noChangeAspect="1"/>
           </p:cNvPicPr>
           <p:nvPr/>
         </p:nvPicPr>
         <p:blipFill>
-          <a:blip r:embed="rId2"/>
+          <a:blip r:embed="rId3"/>
           <a:stretch>
             <a:fillRect/>
           </a:stretch>
         </p:blipFill>
         <p:spPr bwMode="auto">
           <a:xfrm>
-            <a:off x="1143000" y="1092200"/>
-            <a:ext cx="6858000" cy="5486400"/>
+            <a:off x="4953000" y="1092200"/>
+            <a:ext cx="3632200" cy="4978400"/>
           </a:xfrm>
           <a:prstGeom prst="rect">
             <a:avLst/>
@@ -7188,7 +7295,42 @@
           </a:ln>
         </p:spPr>
       </p:pic>
+      <p:sp>
+        <p:nvSpPr>
+          <p:cNvPr id="4" name="TextBox 3"/>
+          <p:cNvSpPr txBox="1"/>
+          <p:nvPr/>
+        </p:nvSpPr>
+        <p:spPr>
+          <a:xfrm>
+            <a:off x="4635500" y="6070600"/>
+            <a:ext cx="4254500" cy="508000"/>
+          </a:xfrm>
+          <a:prstGeom prst="rect">
+            <a:avLst/>
+          </a:prstGeom>
+          <a:noFill/>
+        </p:spPr>
+        <p:txBody>
+          <a:bodyPr/>
+          <a:lstStyle/>
+          <a:p>
+            <a:pPr marL="0" lvl="0" indent="0" algn="ctr">
+              <a:buNone/>
+            </a:pPr>
+            <a:r>
+              <a:rPr sz="1400" dirty="0"/>
+              <a:t>Max Kuhn at West Point Fall 2018</a:t>
+            </a:r>
+          </a:p>
+        </p:txBody>
+      </p:sp>
     </p:spTree>
+    <p:extLst>
+      <p:ext uri="{BB962C8B-B14F-4D97-AF65-F5344CB8AC3E}">
+        <p14:creationId xmlns:p14="http://schemas.microsoft.com/office/powerpoint/2010/main" val="837762731"/>
+      </p:ext>
+    </p:extLst>
   </p:cSld>
   <p:clrMapOvr>
     <a:masterClrMapping/>

</xml_diff>

<commit_message>
adding in all work from 13 nov
</commit_message>
<xml_diff>
--- a/template.pptx
+++ b/template.pptx
@@ -9,7 +9,7 @@
   </p:handoutMasterIdLst>
   <p:sldIdLst>
     <p:sldId id="256" r:id="rId2"/>
-    <p:sldId id="262" r:id="rId3"/>
+    <p:sldId id="263" r:id="rId3"/>
     <p:sldId id="260" r:id="rId4"/>
     <p:sldId id="261" r:id="rId5"/>
   </p:sldIdLst>
@@ -672,13 +672,6 @@
   <p:clrMapOvr>
     <a:masterClrMapping/>
   </p:clrMapOvr>
-  <p:timing>
-    <p:tnLst>
-      <p:par>
-        <p:cTn id="1" dur="indefinite" restart="never" nodeType="tmRoot"/>
-      </p:par>
-    </p:tnLst>
-  </p:timing>
 </p:sldLayout>
 </file>
 
@@ -908,13 +901,6 @@
   <p:clrMapOvr>
     <a:masterClrMapping/>
   </p:clrMapOvr>
-  <p:timing>
-    <p:tnLst>
-      <p:par>
-        <p:cTn id="1" dur="indefinite" restart="never" nodeType="tmRoot"/>
-      </p:par>
-    </p:tnLst>
-  </p:timing>
 </p:sldLayout>
 </file>
 
@@ -1144,13 +1130,6 @@
   <p:clrMapOvr>
     <a:masterClrMapping/>
   </p:clrMapOvr>
-  <p:timing>
-    <p:tnLst>
-      <p:par>
-        <p:cTn id="1" dur="indefinite" restart="never" nodeType="tmRoot"/>
-      </p:par>
-    </p:tnLst>
-  </p:timing>
 </p:sldLayout>
 </file>
 
@@ -1273,13 +1252,6 @@
   <p:clrMapOvr>
     <a:masterClrMapping/>
   </p:clrMapOvr>
-  <p:timing>
-    <p:tnLst>
-      <p:par>
-        <p:cTn id="1" dur="indefinite" restart="never" nodeType="tmRoot"/>
-      </p:par>
-    </p:tnLst>
-  </p:timing>
 </p:sldLayout>
 </file>
 
@@ -1533,13 +1505,6 @@
   <p:clrMapOvr>
     <a:masterClrMapping/>
   </p:clrMapOvr>
-  <p:timing>
-    <p:tnLst>
-      <p:par>
-        <p:cTn id="1" dur="indefinite" restart="never" nodeType="tmRoot"/>
-      </p:par>
-    </p:tnLst>
-  </p:timing>
 </p:sldLayout>
 </file>
 
@@ -1780,13 +1745,6 @@
   <p:clrMapOvr>
     <a:masterClrMapping/>
   </p:clrMapOvr>
-  <p:timing>
-    <p:tnLst>
-      <p:par>
-        <p:cTn id="1" dur="indefinite" restart="never" nodeType="tmRoot"/>
-      </p:par>
-    </p:tnLst>
-  </p:timing>
 </p:sldLayout>
 </file>
 
@@ -2138,13 +2096,6 @@
   <p:clrMapOvr>
     <a:masterClrMapping/>
   </p:clrMapOvr>
-  <p:timing>
-    <p:tnLst>
-      <p:par>
-        <p:cTn id="1" dur="indefinite" restart="never" nodeType="tmRoot"/>
-      </p:par>
-    </p:tnLst>
-  </p:timing>
 </p:sldLayout>
 </file>
 
@@ -2181,10 +2132,9 @@
           <a:lstStyle/>
           <a:p>
             <a:r>
-              <a:rPr lang="en-US" smtClean="0"/>
+              <a:rPr lang="en-US"/>
               <a:t>Click to edit Master title style</a:t>
             </a:r>
-            <a:endParaRPr lang="en-US"/>
           </a:p>
         </p:txBody>
       </p:sp>
@@ -2204,7 +2154,7 @@
           <a:lstStyle/>
           <a:p>
             <a:r>
-              <a:rPr lang="en-US" smtClean="0"/>
+              <a:rPr lang="en-US"/>
               <a:t>June 2019</a:t>
             </a:r>
             <a:endParaRPr lang="en-US" dirty="0"/>
@@ -2267,10 +2217,9 @@
           <a:p>
             <a:pPr lvl="0"/>
             <a:r>
-              <a:rPr lang="en-US" dirty="0" smtClean="0"/>
+              <a:rPr lang="en-US" dirty="0"/>
               <a:t>Left Aligned and 12 Point</a:t>
             </a:r>
-            <a:endParaRPr lang="en-US" dirty="0"/>
           </a:p>
         </p:txBody>
       </p:sp>
@@ -2679,13 +2628,6 @@
   <p:clrMapOvr>
     <a:masterClrMapping/>
   </p:clrMapOvr>
-  <p:timing>
-    <p:tnLst>
-      <p:par>
-        <p:cTn id="1" dur="indefinite" restart="never" nodeType="tmRoot"/>
-      </p:par>
-    </p:tnLst>
-  </p:timing>
 </p:sldLayout>
 </file>
 
@@ -3081,13 +3023,6 @@
   <p:clrMapOvr>
     <a:masterClrMapping/>
   </p:clrMapOvr>
-  <p:timing>
-    <p:tnLst>
-      <p:par>
-        <p:cTn id="1" dur="indefinite" restart="never" nodeType="tmRoot"/>
-      </p:par>
-    </p:tnLst>
-  </p:timing>
 </p:sldLayout>
 </file>
 
@@ -3238,13 +3173,6 @@
   <p:clrMapOvr>
     <a:masterClrMapping/>
   </p:clrMapOvr>
-  <p:timing>
-    <p:tnLst>
-      <p:par>
-        <p:cTn id="1" dur="indefinite" restart="never" nodeType="tmRoot"/>
-      </p:par>
-    </p:tnLst>
-  </p:timing>
 </p:sldLayout>
 </file>
 
@@ -3286,32 +3214,44 @@
           <a:lstStyle>
             <a:lvl1pPr marL="341313" indent="-341313">
               <a:lnSpc>
-                <a:spcPct val="90000"/>
+                <a:spcPct val="100000"/>
               </a:lnSpc>
+              <a:spcBef>
+                <a:spcPts val="0"/>
+              </a:spcBef>
               <a:buFont typeface="Arial" panose="020B0604020202020204" pitchFamily="34" charset="0"/>
               <a:buChar char="•"/>
-              <a:defRPr sz="2000"/>
+              <a:defRPr sz="2400"/>
             </a:lvl1pPr>
             <a:lvl2pPr marL="806450" indent="-350838">
               <a:lnSpc>
-                <a:spcPct val="90000"/>
+                <a:spcPct val="100000"/>
               </a:lnSpc>
+              <a:spcBef>
+                <a:spcPts val="0"/>
+              </a:spcBef>
               <a:buFont typeface="Arial" panose="020B0604020202020204" pitchFamily="34" charset="0"/>
               <a:buChar char="•"/>
               <a:defRPr/>
             </a:lvl2pPr>
             <a:lvl3pPr marL="1263650" indent="-344488">
               <a:lnSpc>
-                <a:spcPct val="90000"/>
+                <a:spcPct val="100000"/>
               </a:lnSpc>
+              <a:spcBef>
+                <a:spcPts val="0"/>
+              </a:spcBef>
               <a:buFont typeface="Arial" panose="020B0604020202020204" pitchFamily="34" charset="0"/>
               <a:buChar char="•"/>
               <a:defRPr/>
             </a:lvl3pPr>
             <a:lvl4pPr marL="1720850" indent="-350838">
               <a:lnSpc>
-                <a:spcPct val="90000"/>
+                <a:spcPct val="100000"/>
               </a:lnSpc>
+              <a:spcBef>
+                <a:spcPts val="0"/>
+              </a:spcBef>
               <a:buFont typeface="Arial" panose="020B0604020202020204" pitchFamily="34" charset="0"/>
               <a:buChar char="•"/>
               <a:defRPr/>
@@ -3392,10 +3332,9 @@
           <a:lstStyle/>
           <a:p>
             <a:r>
-              <a:rPr lang="en-US" dirty="0" smtClean="0"/>
+              <a:rPr lang="en-US" dirty="0"/>
               <a:t>June 2019</a:t>
             </a:r>
-            <a:endParaRPr lang="en-US" dirty="0"/>
           </a:p>
         </p:txBody>
       </p:sp>
@@ -3433,13 +3372,6 @@
   <p:clrMapOvr>
     <a:masterClrMapping/>
   </p:clrMapOvr>
-  <p:timing>
-    <p:tnLst>
-      <p:par>
-        <p:cTn id="1" dur="indefinite" restart="never" nodeType="tmRoot"/>
-      </p:par>
-    </p:tnLst>
-  </p:timing>
 </p:sldLayout>
 </file>
 
@@ -3472,8 +3404,8 @@
         </p:nvSpPr>
         <p:spPr>
           <a:xfrm>
-            <a:off x="623888" y="1709739"/>
-            <a:ext cx="7886700" cy="2852737"/>
+            <a:off x="623888" y="1709740"/>
+            <a:ext cx="7886700" cy="769410"/>
           </a:xfrm>
         </p:spPr>
         <p:txBody>
@@ -3485,10 +3417,9 @@
           </a:lstStyle>
           <a:p>
             <a:r>
-              <a:rPr lang="en-US" smtClean="0"/>
+              <a:rPr lang="en-US" dirty="0"/>
               <a:t>Click to edit Master title style</a:t>
             </a:r>
-            <a:endParaRPr lang="en-US"/>
           </a:p>
         </p:txBody>
       </p:sp>
@@ -3605,7 +3536,7 @@
           <a:p>
             <a:pPr lvl="0"/>
             <a:r>
-              <a:rPr lang="en-US" smtClean="0"/>
+              <a:rPr lang="en-US"/>
               <a:t>Click to edit Master text styles</a:t>
             </a:r>
           </a:p>
@@ -3694,13 +3625,6 @@
   <p:clrMapOvr>
     <a:masterClrMapping/>
   </p:clrMapOvr>
-  <p:timing>
-    <p:tnLst>
-      <p:par>
-        <p:cTn id="1" dur="indefinite" restart="never" nodeType="tmRoot"/>
-      </p:par>
-    </p:tnLst>
-  </p:timing>
 </p:sldLayout>
 </file>
 
@@ -4024,13 +3948,6 @@
   <p:clrMapOvr>
     <a:masterClrMapping/>
   </p:clrMapOvr>
-  <p:timing>
-    <p:tnLst>
-      <p:par>
-        <p:cTn id="1" dur="indefinite" restart="never" nodeType="tmRoot"/>
-      </p:par>
-    </p:tnLst>
-  </p:timing>
 </p:sldLayout>
 </file>
 
@@ -4574,13 +4491,6 @@
   <p:clrMapOvr>
     <a:masterClrMapping/>
   </p:clrMapOvr>
-  <p:timing>
-    <p:tnLst>
-      <p:par>
-        <p:cTn id="1" dur="indefinite" restart="never" nodeType="tmRoot"/>
-      </p:par>
-    </p:tnLst>
-  </p:timing>
 </p:sldLayout>
 </file>
 
@@ -5627,13 +5537,6 @@
   <p:clrMapOvr>
     <a:masterClrMapping/>
   </p:clrMapOvr>
-  <p:timing>
-    <p:tnLst>
-      <p:par>
-        <p:cTn id="1" dur="indefinite" restart="never" nodeType="tmRoot"/>
-      </p:par>
-    </p:tnLst>
-  </p:timing>
 </p:sldLayout>
 </file>
 
@@ -5733,13 +5636,6 @@
   <p:clrMapOvr>
     <a:masterClrMapping/>
   </p:clrMapOvr>
-  <p:timing>
-    <p:tnLst>
-      <p:par>
-        <p:cTn id="1" dur="indefinite" restart="never" nodeType="tmRoot"/>
-      </p:par>
-    </p:tnLst>
-  </p:timing>
 </p:sldLayout>
 </file>
 
@@ -5846,13 +5742,6 @@
   <p:clrMapOvr>
     <a:masterClrMapping/>
   </p:clrMapOvr>
-  <p:timing>
-    <p:tnLst>
-      <p:par>
-        <p:cTn id="1" dur="indefinite" restart="never" nodeType="tmRoot"/>
-      </p:par>
-    </p:tnLst>
-  </p:timing>
 </p:sldLayout>
 </file>
 
@@ -5930,13 +5819,6 @@
   <p:clrMapOvr>
     <a:masterClrMapping/>
   </p:clrMapOvr>
-  <p:timing>
-    <p:tnLst>
-      <p:par>
-        <p:cTn id="1" dur="indefinite" restart="never" nodeType="tmRoot"/>
-      </p:par>
-    </p:tnLst>
-  </p:timing>
 </p:sldLayout>
 </file>
 
@@ -6416,13 +6298,6 @@
     <p:sldLayoutId id="2147483902" r:id="rId18"/>
     <p:sldLayoutId id="2147483903" r:id="rId19"/>
   </p:sldLayoutIdLst>
-  <p:timing>
-    <p:tnLst>
-      <p:par>
-        <p:cTn id="1" dur="indefinite" restart="never" nodeType="tmRoot"/>
-      </p:par>
-    </p:tnLst>
-  </p:timing>
   <p:hf hdr="0" ftr="0"/>
   <p:txStyles>
     <p:titleStyle>
@@ -6921,7 +6796,7 @@
               <a:buNone/>
             </a:pPr>
             <a:r>
-              <a:rPr lang="en-US" dirty="0" smtClean="0"/>
+              <a:rPr lang="en-US" dirty="0"/>
               <a:t>Title Template</a:t>
             </a:r>
             <a:endParaRPr dirty="0"/>
@@ -6951,17 +6826,9 @@
             <a:pPr marL="0" lvl="0" indent="0">
               <a:buNone/>
             </a:pPr>
-            <a:r>
-              <a:rPr dirty="0"/>
-              <a:t/>
-            </a:r>
             <a:br>
               <a:rPr dirty="0"/>
             </a:br>
-            <a:r>
-              <a:rPr dirty="0"/>
-              <a:t/>
-            </a:r>
             <a:br>
               <a:rPr dirty="0"/>
             </a:br>
@@ -7007,12 +6874,18 @@
       </p:grpSpPr>
       <p:sp>
         <p:nvSpPr>
-          <p:cNvPr id="8" name="Title 7"/>
-          <p:cNvSpPr>
-            <a:spLocks noGrp="1"/>
-          </p:cNvSpPr>
-          <p:nvPr>
-            <p:ph type="title"/>
+          <p:cNvPr id="2" name="Content Placeholder 1">
+            <a:extLst>
+              <a:ext uri="{FF2B5EF4-FFF2-40B4-BE49-F238E27FC236}">
+                <a16:creationId xmlns:a16="http://schemas.microsoft.com/office/drawing/2014/main" id="{AB712B13-086E-4DF5-BDDC-9A74FB9DC458}"/>
+              </a:ext>
+            </a:extLst>
+          </p:cNvPr>
+          <p:cNvSpPr>
+            <a:spLocks noGrp="1"/>
+          </p:cNvSpPr>
+          <p:nvPr>
+            <p:ph idx="1"/>
           </p:nvPr>
         </p:nvSpPr>
         <p:spPr/>
@@ -7020,24 +6893,49 @@
           <a:bodyPr/>
           <a:lstStyle/>
           <a:p>
-            <a:pPr marL="0" lvl="0" indent="0">
-              <a:buNone/>
+            <a:pPr>
+              <a:lnSpc>
+                <a:spcPct val="100000"/>
+              </a:lnSpc>
+              <a:spcBef>
+                <a:spcPts val="0"/>
+              </a:spcBef>
             </a:pPr>
             <a:r>
-              <a:rPr/>
-              <a:t>What We’re Going to Do:</a:t>
-            </a:r>
-          </a:p>
-        </p:txBody>
-      </p:sp>
-      <p:sp>
-        <p:nvSpPr>
-          <p:cNvPr id="3" name="Content Placeholder 2"/>
-          <p:cNvSpPr>
-            <a:spLocks noGrp="1"/>
-          </p:cNvSpPr>
-          <p:nvPr>
-            <p:ph idx="1"/>
+              <a:rPr lang="en-US" dirty="0"/>
+              <a:t>Test 1</a:t>
+            </a:r>
+          </a:p>
+          <a:p>
+            <a:pPr lvl="1">
+              <a:lnSpc>
+                <a:spcPct val="100000"/>
+              </a:lnSpc>
+              <a:spcBef>
+                <a:spcPts val="0"/>
+              </a:spcBef>
+            </a:pPr>
+            <a:r>
+              <a:rPr lang="en-US" dirty="0"/>
+              <a:t>Test 2</a:t>
+            </a:r>
+          </a:p>
+        </p:txBody>
+      </p:sp>
+      <p:sp>
+        <p:nvSpPr>
+          <p:cNvPr id="3" name="Title 2">
+            <a:extLst>
+              <a:ext uri="{FF2B5EF4-FFF2-40B4-BE49-F238E27FC236}">
+                <a16:creationId xmlns:a16="http://schemas.microsoft.com/office/drawing/2014/main" id="{CCED6577-99F3-44D6-AA7D-D7A4BAD6BC9A}"/>
+              </a:ext>
+            </a:extLst>
+          </p:cNvPr>
+          <p:cNvSpPr>
+            <a:spLocks noGrp="1"/>
+          </p:cNvSpPr>
+          <p:nvPr>
+            <p:ph type="title"/>
           </p:nvPr>
         </p:nvSpPr>
         <p:spPr/>
@@ -7045,49 +6943,73 @@
           <a:bodyPr/>
           <a:lstStyle/>
           <a:p>
-            <a:pPr lvl="1"/>
-            <a:r>
-              <a:rPr dirty="0"/>
-              <a:t>Introduce a Data Problem</a:t>
-            </a:r>
-          </a:p>
-          <a:p>
-            <a:pPr lvl="2">
-              <a:buFont typeface="Calibri" panose="020F0502020204030204" pitchFamily="34" charset="0"/>
-              <a:buChar char="-"/>
-            </a:pPr>
-            <a:r>
-              <a:rPr dirty="0"/>
-              <a:t>Flying Hour Challenge</a:t>
-            </a:r>
-          </a:p>
-          <a:p>
-            <a:pPr lvl="1"/>
-            <a:r>
-              <a:rPr dirty="0"/>
-              <a:t>Show the ‘old technique’</a:t>
-            </a:r>
-          </a:p>
-          <a:p>
-            <a:pPr lvl="1"/>
-            <a:r>
-              <a:rPr dirty="0"/>
-              <a:t>Show the new technique</a:t>
-            </a:r>
-          </a:p>
-          <a:p>
-            <a:pPr lvl="1"/>
-            <a:r>
-              <a:rPr dirty="0"/>
-              <a:t>Discuss Challenges</a:t>
-            </a:r>
+            <a:endParaRPr lang="en-US"/>
+          </a:p>
+        </p:txBody>
+      </p:sp>
+      <p:sp>
+        <p:nvSpPr>
+          <p:cNvPr id="4" name="Date Placeholder 3">
+            <a:extLst>
+              <a:ext uri="{FF2B5EF4-FFF2-40B4-BE49-F238E27FC236}">
+                <a16:creationId xmlns:a16="http://schemas.microsoft.com/office/drawing/2014/main" id="{9BDCFEF7-EA70-4907-87EC-9609F14AE941}"/>
+              </a:ext>
+            </a:extLst>
+          </p:cNvPr>
+          <p:cNvSpPr>
+            <a:spLocks noGrp="1"/>
+          </p:cNvSpPr>
+          <p:nvPr>
+            <p:ph type="dt" sz="half" idx="10"/>
+          </p:nvPr>
+        </p:nvSpPr>
+        <p:spPr/>
+        <p:txBody>
+          <a:bodyPr/>
+          <a:lstStyle/>
+          <a:p>
+            <a:r>
+              <a:rPr lang="en-US"/>
+              <a:t>June 2019</a:t>
+            </a:r>
+            <a:endParaRPr lang="en-US" dirty="0"/>
+          </a:p>
+        </p:txBody>
+      </p:sp>
+      <p:sp>
+        <p:nvSpPr>
+          <p:cNvPr id="5" name="Slide Number Placeholder 4">
+            <a:extLst>
+              <a:ext uri="{FF2B5EF4-FFF2-40B4-BE49-F238E27FC236}">
+                <a16:creationId xmlns:a16="http://schemas.microsoft.com/office/drawing/2014/main" id="{645DB80E-CF18-4DFB-A988-5D770ACC89F0}"/>
+              </a:ext>
+            </a:extLst>
+          </p:cNvPr>
+          <p:cNvSpPr>
+            <a:spLocks noGrp="1"/>
+          </p:cNvSpPr>
+          <p:nvPr>
+            <p:ph type="sldNum" sz="quarter" idx="11"/>
+          </p:nvPr>
+        </p:nvSpPr>
+        <p:spPr/>
+        <p:txBody>
+          <a:bodyPr/>
+          <a:lstStyle/>
+          <a:p>
+            <a:fld id="{CB29584B-2C78-4F19-9D57-A8D27C3B25A0}" type="slidenum">
+              <a:rPr lang="en-US" smtClean="0"/>
+              <a:pPr/>
+              <a:t>2</a:t>
+            </a:fld>
+            <a:endParaRPr lang="en-US" dirty="0"/>
           </a:p>
         </p:txBody>
       </p:sp>
     </p:spTree>
     <p:extLst>
       <p:ext uri="{BB962C8B-B14F-4D97-AF65-F5344CB8AC3E}">
-        <p14:creationId xmlns:p14="http://schemas.microsoft.com/office/powerpoint/2010/main" val="709530783"/>
+        <p14:creationId xmlns:p14="http://schemas.microsoft.com/office/powerpoint/2010/main" val="3072250053"/>
       </p:ext>
     </p:extLst>
   </p:cSld>
@@ -7162,13 +7084,6 @@
   <p:clrMapOvr>
     <a:masterClrMapping/>
   </p:clrMapOvr>
-  <p:timing>
-    <p:tnLst>
-      <p:par>
-        <p:cTn id="1" dur="indefinite" restart="never" nodeType="tmRoot"/>
-      </p:par>
-    </p:tnLst>
-  </p:timing>
 </p:sld>
 </file>
 
@@ -7208,7 +7123,6 @@
               <a:buNone/>
             </a:pPr>
             <a:r>
-              <a:rPr/>
               <a:t>Tidymodels</a:t>
             </a:r>
           </a:p>
@@ -7231,7 +7145,6 @@
           <a:p>
             <a:pPr lvl="1"/>
             <a:r>
-              <a:rPr/>
               <a:t>“</a:t>
             </a:r>
             <a:r>
@@ -7241,7 +7154,6 @@
               <a:t>tidymodels</a:t>
             </a:r>
             <a:r>
-              <a:rPr/>
               <a:t> is a ’’meta-package” for modeling and statistical analysis that share the underlying design philosophy, grammar, and data structures of the tidyverse."</a:t>
             </a:r>
           </a:p>

</xml_diff>